<commit_message>
trying to fix bad objectives (still need to reorganize the actual content)
</commit_message>
<xml_diff>
--- a/unit_01/slides/Unit01-PartIII.pptx
+++ b/unit_01/slides/Unit01-PartIII.pptx
@@ -229,7 +229,7 @@
           <a:p>
             <a:fld id="{DEF45A3F-F083-4E1A-8339-FCD652B27D36}" type="datetimeFigureOut">
               <a:rPr lang="en-US" smtClean="0"/>
-              <a:t>9/2/2020</a:t>
+              <a:t>9/8/2020</a:t>
             </a:fld>
             <a:endParaRPr lang="en-US" dirty="0"/>
           </a:p>
@@ -1049,7 +1049,7 @@
           <a:p>
             <a:fld id="{EB2553B6-A683-4C13-ADF3-6E78B5B860F6}" type="datetime1">
               <a:rPr lang="en-US" smtClean="0"/>
-              <a:t>9/2/2020</a:t>
+              <a:t>9/8/2020</a:t>
             </a:fld>
             <a:endParaRPr lang="en-US" dirty="0"/>
           </a:p>
@@ -1251,7 +1251,7 @@
           <a:p>
             <a:fld id="{6DA00B11-1D47-4652-AEE5-4C2B1235CB66}" type="datetime1">
               <a:rPr lang="en-US" smtClean="0"/>
-              <a:t>9/2/2020</a:t>
+              <a:t>9/8/2020</a:t>
             </a:fld>
             <a:endParaRPr lang="en-US" dirty="0"/>
           </a:p>
@@ -1850,7 +1850,7 @@
           <a:p>
             <a:fld id="{90AC2323-8C5A-462B-92B9-62EA14FA9E94}" type="datetime1">
               <a:rPr lang="en-US" smtClean="0"/>
-              <a:t>9/2/2020</a:t>
+              <a:t>9/8/2020</a:t>
             </a:fld>
             <a:endParaRPr lang="en-US" dirty="0"/>
           </a:p>
@@ -2170,7 +2170,7 @@
           <a:p>
             <a:fld id="{10DC40C2-59E9-46C8-B03E-7C20E5F4F12D}" type="datetime1">
               <a:rPr lang="en-US" smtClean="0"/>
-              <a:t>9/2/2020</a:t>
+              <a:t>9/8/2020</a:t>
             </a:fld>
             <a:endParaRPr lang="en-US" dirty="0"/>
           </a:p>
@@ -2607,7 +2607,7 @@
           <a:p>
             <a:fld id="{7FBC8CB6-941B-4270-8276-FD8E92A373DA}" type="datetime1">
               <a:rPr lang="en-US" smtClean="0"/>
-              <a:t>9/2/2020</a:t>
+              <a:t>9/8/2020</a:t>
             </a:fld>
             <a:endParaRPr lang="en-US" dirty="0"/>
           </a:p>
@@ -2725,7 +2725,7 @@
           <a:p>
             <a:fld id="{15E57E43-E251-46CB-9ADD-5572689A0D73}" type="datetime1">
               <a:rPr lang="en-US" smtClean="0"/>
-              <a:t>9/2/2020</a:t>
+              <a:t>9/8/2020</a:t>
             </a:fld>
             <a:endParaRPr lang="en-US" dirty="0"/>
           </a:p>
@@ -2820,7 +2820,7 @@
           <a:p>
             <a:fld id="{9582FC12-F480-42AE-9F3F-3DA69EB64A0D}" type="datetime1">
               <a:rPr lang="en-US" smtClean="0"/>
-              <a:t>9/2/2020</a:t>
+              <a:t>9/8/2020</a:t>
             </a:fld>
             <a:endParaRPr lang="en-US" dirty="0"/>
           </a:p>
@@ -3237,7 +3237,7 @@
           <a:p>
             <a:fld id="{545CEF3F-6F6A-4297-B757-FFB5D4A3AD64}" type="datetime1">
               <a:rPr lang="en-US" smtClean="0"/>
-              <a:t>9/2/2020</a:t>
+              <a:t>9/8/2020</a:t>
             </a:fld>
             <a:endParaRPr lang="en-US" dirty="0"/>
           </a:p>
@@ -3497,7 +3497,7 @@
           <a:p>
             <a:fld id="{EE2F6E23-5248-4ECD-8C29-1FB95B395C86}" type="datetime1">
               <a:rPr lang="en-US" smtClean="0"/>
-              <a:t>9/2/2020</a:t>
+              <a:t>9/8/2020</a:t>
             </a:fld>
             <a:endParaRPr lang="en-US" dirty="0"/>
           </a:p>
@@ -4013,7 +4013,7 @@
           <a:p>
             <a:fld id="{5DE9F2A3-885D-46CC-9642-01CAAE4EB600}" type="datetime1">
               <a:rPr lang="en-US" smtClean="0"/>
-              <a:t>9/2/2020</a:t>
+              <a:t>9/8/2020</a:t>
             </a:fld>
             <a:endParaRPr lang="en-US" dirty="0"/>
           </a:p>
@@ -6716,9 +6716,10 @@
           <a:lstStyle/>
           <a:p>
             <a:r>
-              <a:rPr lang="en-US" sz="1800" dirty="0"/>
-              <a:t>Using express.js in a node.js application (Part I)</a:t>
-            </a:r>
+              <a:rPr lang="en-US" sz="1800"/>
+              <a:t>How to build web applications with express.js</a:t>
+            </a:r>
+            <a:endParaRPr lang="en-US" sz="1800" dirty="0"/>
           </a:p>
         </p:txBody>
       </p:sp>
@@ -9865,9 +9866,10 @@
           <a:lstStyle/>
           <a:p>
             <a:r>
-              <a:rPr lang="en-US" sz="1800" dirty="0"/>
-              <a:t>How to use express.js in a node.js application</a:t>
-            </a:r>
+              <a:rPr lang="en-US" sz="1800"/>
+              <a:t>How to build web applications with express.js</a:t>
+            </a:r>
+            <a:endParaRPr lang="en-US" sz="1800" dirty="0"/>
           </a:p>
           <a:p>
             <a:endParaRPr lang="en-US" sz="1800" dirty="0"/>
@@ -11462,6 +11464,15 @@
 </file>
 
 <file path=customXml/item2.xml><?xml version="1.0" encoding="utf-8"?>
+<p:properties xmlns:p="http://schemas.microsoft.com/office/2006/metadata/properties" xmlns:xsi="http://www.w3.org/2001/XMLSchema-instance" xmlns:pc="http://schemas.microsoft.com/office/infopath/2007/PartnerControls">
+  <documentManagement>
+    <Status xmlns="71af3243-3dd4-4a8d-8c0d-dd76da1f02a5">Not started</Status>
+    <MediaServiceKeyPoints xmlns="71af3243-3dd4-4a8d-8c0d-dd76da1f02a5" xsi:nil="true"/>
+  </documentManagement>
+</p:properties>
+</file>
+
+<file path=customXml/item3.xml><?xml version="1.0" encoding="utf-8"?>
 <ct:contentTypeSchema xmlns:ct="http://schemas.microsoft.com/office/2006/metadata/contentType" xmlns:ma="http://schemas.microsoft.com/office/2006/metadata/properties/metaAttributes" ct:_="" ma:_="" ma:contentTypeName="Document" ma:contentTypeID="0x01010079F111ED35F8CC479449609E8A0923A6" ma:contentTypeVersion="12" ma:contentTypeDescription="Create a new document." ma:contentTypeScope="" ma:versionID="a410dd7f93c95333ffa1b60ed6adedd1">
   <xsd:schema xmlns:xsd="http://www.w3.org/2001/XMLSchema" xmlns:xs="http://www.w3.org/2001/XMLSchema" xmlns:p="http://schemas.microsoft.com/office/2006/metadata/properties" xmlns:ns2="71af3243-3dd4-4a8d-8c0d-dd76da1f02a5" xmlns:ns3="16c05727-aa75-4e4a-9b5f-8a80a1165891" targetNamespace="http://schemas.microsoft.com/office/2006/metadata/properties" ma:root="true" ma:fieldsID="a936d9baba76aa3866493feff160faab" ns2:_="" ns3:_="">
     <xsd:import namespace="71af3243-3dd4-4a8d-8c0d-dd76da1f02a5"/>
@@ -11682,15 +11693,6 @@
 </ct:contentTypeSchema>
 </file>
 
-<file path=customXml/item3.xml><?xml version="1.0" encoding="utf-8"?>
-<p:properties xmlns:p="http://schemas.microsoft.com/office/2006/metadata/properties" xmlns:xsi="http://www.w3.org/2001/XMLSchema-instance" xmlns:pc="http://schemas.microsoft.com/office/infopath/2007/PartnerControls">
-  <documentManagement>
-    <Status xmlns="71af3243-3dd4-4a8d-8c0d-dd76da1f02a5">Not started</Status>
-    <MediaServiceKeyPoints xmlns="71af3243-3dd4-4a8d-8c0d-dd76da1f02a5" xsi:nil="true"/>
-  </documentManagement>
-</p:properties>
-</file>
-
 <file path=customXml/itemProps1.xml><?xml version="1.0" encoding="utf-8"?>
 <ds:datastoreItem xmlns:ds="http://schemas.openxmlformats.org/officeDocument/2006/customXml" ds:itemID="{CDB58277-F8DF-46FF-84EC-EF41B835E69F}">
   <ds:schemaRefs>
@@ -11700,6 +11702,23 @@
 </file>
 
 <file path=customXml/itemProps2.xml><?xml version="1.0" encoding="utf-8"?>
+<ds:datastoreItem xmlns:ds="http://schemas.openxmlformats.org/officeDocument/2006/customXml" ds:itemID="{137651BA-F45C-4845-9AB3-E0A65B39F5E1}">
+  <ds:schemaRefs>
+    <ds:schemaRef ds:uri="http://purl.org/dc/elements/1.1/"/>
+    <ds:schemaRef ds:uri="http://schemas.microsoft.com/office/2006/metadata/properties"/>
+    <ds:schemaRef ds:uri="http://purl.org/dc/terms/"/>
+    <ds:schemaRef ds:uri="http://schemas.openxmlformats.org/package/2006/metadata/core-properties"/>
+    <ds:schemaRef ds:uri="16c05727-aa75-4e4a-9b5f-8a80a1165891"/>
+    <ds:schemaRef ds:uri="http://schemas.microsoft.com/office/2006/documentManagement/types"/>
+    <ds:schemaRef ds:uri="http://schemas.microsoft.com/office/infopath/2007/PartnerControls"/>
+    <ds:schemaRef ds:uri="71af3243-3dd4-4a8d-8c0d-dd76da1f02a5"/>
+    <ds:schemaRef ds:uri="http://www.w3.org/XML/1998/namespace"/>
+    <ds:schemaRef ds:uri="http://purl.org/dc/dcmitype/"/>
+  </ds:schemaRefs>
+</ds:datastoreItem>
+</file>
+
+<file path=customXml/itemProps3.xml><?xml version="1.0" encoding="utf-8"?>
 <ds:datastoreItem xmlns:ds="http://schemas.openxmlformats.org/officeDocument/2006/customXml" ds:itemID="{2D276E62-80A3-44DD-9BCC-97ED2B99B57F}">
   <ds:schemaRefs>
     <ds:schemaRef ds:uri="http://schemas.microsoft.com/office/2006/metadata/contentType"/>
@@ -11716,21 +11735,4 @@
     <ds:schemaRef ds:uri="http://schemas.microsoft.com/internal/obd"/>
   </ds:schemaRefs>
 </ds:datastoreItem>
-</file>
-
-<file path=customXml/itemProps3.xml><?xml version="1.0" encoding="utf-8"?>
-<ds:datastoreItem xmlns:ds="http://schemas.openxmlformats.org/officeDocument/2006/customXml" ds:itemID="{137651BA-F45C-4845-9AB3-E0A65B39F5E1}">
-  <ds:schemaRefs>
-    <ds:schemaRef ds:uri="http://purl.org/dc/elements/1.1/"/>
-    <ds:schemaRef ds:uri="http://schemas.microsoft.com/office/2006/metadata/properties"/>
-    <ds:schemaRef ds:uri="http://purl.org/dc/terms/"/>
-    <ds:schemaRef ds:uri="http://schemas.openxmlformats.org/package/2006/metadata/core-properties"/>
-    <ds:schemaRef ds:uri="16c05727-aa75-4e4a-9b5f-8a80a1165891"/>
-    <ds:schemaRef ds:uri="http://schemas.microsoft.com/office/2006/documentManagement/types"/>
-    <ds:schemaRef ds:uri="http://schemas.microsoft.com/office/infopath/2007/PartnerControls"/>
-    <ds:schemaRef ds:uri="71af3243-3dd4-4a8d-8c0d-dd76da1f02a5"/>
-    <ds:schemaRef ds:uri="http://www.w3.org/XML/1998/namespace"/>
-    <ds:schemaRef ds:uri="http://purl.org/dc/dcmitype/"/>
-  </ds:schemaRefs>
-</ds:datastoreItem>
 </file>
</xml_diff>